<commit_message>
Chap05: Distant picture fixed, PWProbe too but need to be exported.
</commit_message>
<xml_diff>
--- a/05-CrDyn/Pictures/PWProbe.pptx
+++ b/05-CrDyn/Pictures/PWProbe.pptx
@@ -288,7 +288,7 @@
           <a:p>
             <a:fld id="{FD2658F1-287C-49A0-86C8-F3A2CA321B91}" type="datetimeFigureOut">
               <a:rPr lang="fr-FR" smtClean="0"/>
-              <a:t>29/06/2017</a:t>
+              <a:t>03/07/2017</a:t>
             </a:fld>
             <a:endParaRPr lang="fr-FR"/>
           </a:p>
@@ -458,7 +458,7 @@
           <a:p>
             <a:fld id="{FD2658F1-287C-49A0-86C8-F3A2CA321B91}" type="datetimeFigureOut">
               <a:rPr lang="fr-FR" smtClean="0"/>
-              <a:t>29/06/2017</a:t>
+              <a:t>03/07/2017</a:t>
             </a:fld>
             <a:endParaRPr lang="fr-FR"/>
           </a:p>
@@ -638,7 +638,7 @@
           <a:p>
             <a:fld id="{FD2658F1-287C-49A0-86C8-F3A2CA321B91}" type="datetimeFigureOut">
               <a:rPr lang="fr-FR" smtClean="0"/>
-              <a:t>29/06/2017</a:t>
+              <a:t>03/07/2017</a:t>
             </a:fld>
             <a:endParaRPr lang="fr-FR"/>
           </a:p>
@@ -808,7 +808,7 @@
           <a:p>
             <a:fld id="{FD2658F1-287C-49A0-86C8-F3A2CA321B91}" type="datetimeFigureOut">
               <a:rPr lang="fr-FR" smtClean="0"/>
-              <a:t>29/06/2017</a:t>
+              <a:t>03/07/2017</a:t>
             </a:fld>
             <a:endParaRPr lang="fr-FR"/>
           </a:p>
@@ -1054,7 +1054,7 @@
           <a:p>
             <a:fld id="{FD2658F1-287C-49A0-86C8-F3A2CA321B91}" type="datetimeFigureOut">
               <a:rPr lang="fr-FR" smtClean="0"/>
-              <a:t>29/06/2017</a:t>
+              <a:t>03/07/2017</a:t>
             </a:fld>
             <a:endParaRPr lang="fr-FR"/>
           </a:p>
@@ -1342,7 +1342,7 @@
           <a:p>
             <a:fld id="{FD2658F1-287C-49A0-86C8-F3A2CA321B91}" type="datetimeFigureOut">
               <a:rPr lang="fr-FR" smtClean="0"/>
-              <a:t>29/06/2017</a:t>
+              <a:t>03/07/2017</a:t>
             </a:fld>
             <a:endParaRPr lang="fr-FR"/>
           </a:p>
@@ -1769,7 +1769,7 @@
           <a:p>
             <a:fld id="{FD2658F1-287C-49A0-86C8-F3A2CA321B91}" type="datetimeFigureOut">
               <a:rPr lang="fr-FR" smtClean="0"/>
-              <a:t>29/06/2017</a:t>
+              <a:t>03/07/2017</a:t>
             </a:fld>
             <a:endParaRPr lang="fr-FR"/>
           </a:p>
@@ -1887,7 +1887,7 @@
           <a:p>
             <a:fld id="{FD2658F1-287C-49A0-86C8-F3A2CA321B91}" type="datetimeFigureOut">
               <a:rPr lang="fr-FR" smtClean="0"/>
-              <a:t>29/06/2017</a:t>
+              <a:t>03/07/2017</a:t>
             </a:fld>
             <a:endParaRPr lang="fr-FR"/>
           </a:p>
@@ -1982,7 +1982,7 @@
           <a:p>
             <a:fld id="{FD2658F1-287C-49A0-86C8-F3A2CA321B91}" type="datetimeFigureOut">
               <a:rPr lang="fr-FR" smtClean="0"/>
-              <a:t>29/06/2017</a:t>
+              <a:t>03/07/2017</a:t>
             </a:fld>
             <a:endParaRPr lang="fr-FR"/>
           </a:p>
@@ -2259,7 +2259,7 @@
           <a:p>
             <a:fld id="{FD2658F1-287C-49A0-86C8-F3A2CA321B91}" type="datetimeFigureOut">
               <a:rPr lang="fr-FR" smtClean="0"/>
-              <a:t>29/06/2017</a:t>
+              <a:t>03/07/2017</a:t>
             </a:fld>
             <a:endParaRPr lang="fr-FR"/>
           </a:p>
@@ -2512,7 +2512,7 @@
           <a:p>
             <a:fld id="{FD2658F1-287C-49A0-86C8-F3A2CA321B91}" type="datetimeFigureOut">
               <a:rPr lang="fr-FR" smtClean="0"/>
-              <a:t>29/06/2017</a:t>
+              <a:t>03/07/2017</a:t>
             </a:fld>
             <a:endParaRPr lang="fr-FR"/>
           </a:p>
@@ -2725,7 +2725,7 @@
           <a:p>
             <a:fld id="{FD2658F1-287C-49A0-86C8-F3A2CA321B91}" type="datetimeFigureOut">
               <a:rPr lang="fr-FR" smtClean="0"/>
-              <a:t>29/06/2017</a:t>
+              <a:t>03/07/2017</a:t>
             </a:fld>
             <a:endParaRPr lang="fr-FR"/>
           </a:p>
@@ -3154,6 +3154,114 @@
           </a:extLst>
         </p:spPr>
       </p:pic>
+      <p:sp>
+        <p:nvSpPr>
+          <p:cNvPr id="3" name="ZoneTexte 2"/>
+          <p:cNvSpPr txBox="1"/>
+          <p:nvPr/>
+        </p:nvSpPr>
+        <p:spPr>
+          <a:xfrm>
+            <a:off x="191269" y="-230833"/>
+            <a:ext cx="526106" cy="461665"/>
+          </a:xfrm>
+          <a:prstGeom prst="rect">
+            <a:avLst/>
+          </a:prstGeom>
+          <a:noFill/>
+        </p:spPr>
+        <p:txBody>
+          <a:bodyPr wrap="none" rtlCol="0">
+            <a:spAutoFit/>
+          </a:bodyPr>
+          <a:lstStyle/>
+          <a:p>
+            <a:r>
+              <a:rPr lang="fr-FR" sz="2400" dirty="0" smtClean="0">
+                <a:latin typeface="Times New Roman" panose="02020603050405020304" pitchFamily="18" charset="0"/>
+                <a:cs typeface="Times New Roman" panose="02020603050405020304" pitchFamily="18" charset="0"/>
+              </a:rPr>
+              <a:t>(a)</a:t>
+            </a:r>
+            <a:endParaRPr lang="fr-FR" sz="2400" dirty="0">
+              <a:latin typeface="Times New Roman" panose="02020603050405020304" pitchFamily="18" charset="0"/>
+              <a:cs typeface="Times New Roman" panose="02020603050405020304" pitchFamily="18" charset="0"/>
+            </a:endParaRPr>
+          </a:p>
+        </p:txBody>
+      </p:sp>
+      <p:sp>
+        <p:nvSpPr>
+          <p:cNvPr id="4" name="ZoneTexte 3"/>
+          <p:cNvSpPr txBox="1"/>
+          <p:nvPr/>
+        </p:nvSpPr>
+        <p:spPr>
+          <a:xfrm>
+            <a:off x="3715200" y="-234305"/>
+            <a:ext cx="543739" cy="461665"/>
+          </a:xfrm>
+          <a:prstGeom prst="rect">
+            <a:avLst/>
+          </a:prstGeom>
+          <a:noFill/>
+        </p:spPr>
+        <p:txBody>
+          <a:bodyPr wrap="none" rtlCol="0">
+            <a:spAutoFit/>
+          </a:bodyPr>
+          <a:lstStyle/>
+          <a:p>
+            <a:r>
+              <a:rPr lang="fr-FR" sz="2400" dirty="0" smtClean="0">
+                <a:latin typeface="Times New Roman" panose="02020603050405020304" pitchFamily="18" charset="0"/>
+                <a:cs typeface="Times New Roman" panose="02020603050405020304" pitchFamily="18" charset="0"/>
+              </a:rPr>
+              <a:t>(b)</a:t>
+            </a:r>
+            <a:endParaRPr lang="fr-FR" sz="2400" dirty="0">
+              <a:latin typeface="Times New Roman" panose="02020603050405020304" pitchFamily="18" charset="0"/>
+              <a:cs typeface="Times New Roman" panose="02020603050405020304" pitchFamily="18" charset="0"/>
+            </a:endParaRPr>
+          </a:p>
+        </p:txBody>
+      </p:sp>
+      <p:sp>
+        <p:nvSpPr>
+          <p:cNvPr id="5" name="ZoneTexte 4"/>
+          <p:cNvSpPr txBox="1"/>
+          <p:nvPr/>
+        </p:nvSpPr>
+        <p:spPr>
+          <a:xfrm>
+            <a:off x="7131600" y="-234305"/>
+            <a:ext cx="526106" cy="461665"/>
+          </a:xfrm>
+          <a:prstGeom prst="rect">
+            <a:avLst/>
+          </a:prstGeom>
+          <a:noFill/>
+        </p:spPr>
+        <p:txBody>
+          <a:bodyPr wrap="none" rtlCol="0">
+            <a:spAutoFit/>
+          </a:bodyPr>
+          <a:lstStyle/>
+          <a:p>
+            <a:r>
+              <a:rPr lang="fr-FR" sz="2400" dirty="0" smtClean="0">
+                <a:latin typeface="Times New Roman" panose="02020603050405020304" pitchFamily="18" charset="0"/>
+                <a:cs typeface="Times New Roman" panose="02020603050405020304" pitchFamily="18" charset="0"/>
+              </a:rPr>
+              <a:t>(c)</a:t>
+            </a:r>
+            <a:endParaRPr lang="fr-FR" sz="2400" dirty="0">
+              <a:latin typeface="Times New Roman" panose="02020603050405020304" pitchFamily="18" charset="0"/>
+              <a:cs typeface="Times New Roman" panose="02020603050405020304" pitchFamily="18" charset="0"/>
+            </a:endParaRPr>
+          </a:p>
+        </p:txBody>
+      </p:sp>
     </p:spTree>
     <p:extLst>
       <p:ext uri="{BB962C8B-B14F-4D97-AF65-F5344CB8AC3E}">

</xml_diff>

<commit_message>
Chap05: Part 3.1 written
</commit_message>
<xml_diff>
--- a/05-CrDyn/Pictures/PWProbe.pptx
+++ b/05-CrDyn/Pictures/PWProbe.pptx
@@ -7,7 +7,7 @@
   <p:sldIdLst>
     <p:sldId id="256" r:id="rId2"/>
   </p:sldIdLst>
-  <p:sldSz cx="10621963" cy="5580063"/>
+  <p:sldSz cx="10872788" cy="5580063"/>
   <p:notesSz cx="6858000" cy="9144000"/>
   <p:defaultTextStyle>
     <a:defPPr>
@@ -136,8 +136,8 @@
         </p:nvSpPr>
         <p:spPr>
           <a:xfrm>
-            <a:off x="796649" y="1733436"/>
-            <a:ext cx="9028668" cy="1196098"/>
+            <a:off x="815462" y="1733436"/>
+            <a:ext cx="9241870" cy="1196098"/>
           </a:xfrm>
         </p:spPr>
         <p:txBody>
@@ -164,8 +164,8 @@
         </p:nvSpPr>
         <p:spPr>
           <a:xfrm>
-            <a:off x="1593295" y="3162036"/>
-            <a:ext cx="7435376" cy="1426017"/>
+            <a:off x="1630920" y="3162039"/>
+            <a:ext cx="7610954" cy="1426017"/>
           </a:xfrm>
         </p:spPr>
         <p:txBody>
@@ -288,7 +288,7 @@
           <a:p>
             <a:fld id="{FD2658F1-287C-49A0-86C8-F3A2CA321B91}" type="datetimeFigureOut">
               <a:rPr lang="fr-FR" smtClean="0"/>
-              <a:t>03/07/2017</a:t>
+              <a:t>20/10/2017</a:t>
             </a:fld>
             <a:endParaRPr lang="fr-FR"/>
           </a:p>
@@ -458,7 +458,7 @@
           <a:p>
             <a:fld id="{FD2658F1-287C-49A0-86C8-F3A2CA321B91}" type="datetimeFigureOut">
               <a:rPr lang="fr-FR" smtClean="0"/>
-              <a:t>03/07/2017</a:t>
+              <a:t>20/10/2017</a:t>
             </a:fld>
             <a:endParaRPr lang="fr-FR"/>
           </a:p>
@@ -548,8 +548,8 @@
         </p:nvSpPr>
         <p:spPr>
           <a:xfrm>
-            <a:off x="8490194" y="210545"/>
-            <a:ext cx="2635207" cy="4498926"/>
+            <a:off x="8690680" y="210545"/>
+            <a:ext cx="2697435" cy="4498926"/>
           </a:xfrm>
         </p:spPr>
         <p:txBody>
@@ -576,8 +576,8 @@
         </p:nvSpPr>
         <p:spPr>
           <a:xfrm>
-            <a:off x="584579" y="210545"/>
-            <a:ext cx="7728583" cy="4498926"/>
+            <a:off x="598385" y="210545"/>
+            <a:ext cx="7911084" cy="4498926"/>
           </a:xfrm>
         </p:spPr>
         <p:txBody>
@@ -638,7 +638,7 @@
           <a:p>
             <a:fld id="{FD2658F1-287C-49A0-86C8-F3A2CA321B91}" type="datetimeFigureOut">
               <a:rPr lang="fr-FR" smtClean="0"/>
-              <a:t>03/07/2017</a:t>
+              <a:t>20/10/2017</a:t>
             </a:fld>
             <a:endParaRPr lang="fr-FR"/>
           </a:p>
@@ -808,7 +808,7 @@
           <a:p>
             <a:fld id="{FD2658F1-287C-49A0-86C8-F3A2CA321B91}" type="datetimeFigureOut">
               <a:rPr lang="fr-FR" smtClean="0"/>
-              <a:t>03/07/2017</a:t>
+              <a:t>20/10/2017</a:t>
             </a:fld>
             <a:endParaRPr lang="fr-FR"/>
           </a:p>
@@ -898,8 +898,8 @@
         </p:nvSpPr>
         <p:spPr>
           <a:xfrm>
-            <a:off x="839064" y="3585708"/>
-            <a:ext cx="9028668" cy="1108262"/>
+            <a:off x="858878" y="3585708"/>
+            <a:ext cx="9241870" cy="1108262"/>
           </a:xfrm>
         </p:spPr>
         <p:txBody>
@@ -930,8 +930,8 @@
         </p:nvSpPr>
         <p:spPr>
           <a:xfrm>
-            <a:off x="839064" y="2365070"/>
-            <a:ext cx="9028668" cy="1220639"/>
+            <a:off x="858878" y="2365073"/>
+            <a:ext cx="9241870" cy="1220639"/>
           </a:xfrm>
         </p:spPr>
         <p:txBody>
@@ -1054,7 +1054,7 @@
           <a:p>
             <a:fld id="{FD2658F1-287C-49A0-86C8-F3A2CA321B91}" type="datetimeFigureOut">
               <a:rPr lang="fr-FR" smtClean="0"/>
-              <a:t>03/07/2017</a:t>
+              <a:t>20/10/2017</a:t>
             </a:fld>
             <a:endParaRPr lang="fr-FR"/>
           </a:p>
@@ -1167,8 +1167,8 @@
         </p:nvSpPr>
         <p:spPr>
           <a:xfrm>
-            <a:off x="584579" y="1229683"/>
-            <a:ext cx="5181895" cy="3479789"/>
+            <a:off x="598384" y="1229686"/>
+            <a:ext cx="5304259" cy="3479789"/>
           </a:xfrm>
         </p:spPr>
         <p:txBody>
@@ -1252,8 +1252,8 @@
         </p:nvSpPr>
         <p:spPr>
           <a:xfrm>
-            <a:off x="5943508" y="1229683"/>
-            <a:ext cx="5181895" cy="3479789"/>
+            <a:off x="6083858" y="1229686"/>
+            <a:ext cx="5304259" cy="3479789"/>
           </a:xfrm>
         </p:spPr>
         <p:txBody>
@@ -1342,7 +1342,7 @@
           <a:p>
             <a:fld id="{FD2658F1-287C-49A0-86C8-F3A2CA321B91}" type="datetimeFigureOut">
               <a:rPr lang="fr-FR" smtClean="0"/>
-              <a:t>03/07/2017</a:t>
+              <a:t>20/10/2017</a:t>
             </a:fld>
             <a:endParaRPr lang="fr-FR"/>
           </a:p>
@@ -1432,8 +1432,8 @@
         </p:nvSpPr>
         <p:spPr>
           <a:xfrm>
-            <a:off x="531099" y="223463"/>
-            <a:ext cx="9559768" cy="930011"/>
+            <a:off x="543640" y="223466"/>
+            <a:ext cx="9785511" cy="930011"/>
           </a:xfrm>
         </p:spPr>
         <p:txBody>
@@ -1464,8 +1464,8 @@
         </p:nvSpPr>
         <p:spPr>
           <a:xfrm>
-            <a:off x="531099" y="1249057"/>
-            <a:ext cx="4693212" cy="520547"/>
+            <a:off x="543641" y="1249058"/>
+            <a:ext cx="4804036" cy="520547"/>
           </a:xfrm>
         </p:spPr>
         <p:txBody>
@@ -1529,8 +1529,8 @@
         </p:nvSpPr>
         <p:spPr>
           <a:xfrm>
-            <a:off x="531099" y="1769606"/>
-            <a:ext cx="4693212" cy="3214995"/>
+            <a:off x="543641" y="1769609"/>
+            <a:ext cx="4804036" cy="3214995"/>
           </a:xfrm>
         </p:spPr>
         <p:txBody>
@@ -1614,8 +1614,8 @@
         </p:nvSpPr>
         <p:spPr>
           <a:xfrm>
-            <a:off x="5395812" y="1249057"/>
-            <a:ext cx="4695054" cy="520547"/>
+            <a:off x="5523228" y="1249058"/>
+            <a:ext cx="4805923" cy="520547"/>
           </a:xfrm>
         </p:spPr>
         <p:txBody>
@@ -1679,8 +1679,8 @@
         </p:nvSpPr>
         <p:spPr>
           <a:xfrm>
-            <a:off x="5395812" y="1769606"/>
-            <a:ext cx="4695054" cy="3214995"/>
+            <a:off x="5523228" y="1769609"/>
+            <a:ext cx="4805923" cy="3214995"/>
           </a:xfrm>
         </p:spPr>
         <p:txBody>
@@ -1769,7 +1769,7 @@
           <a:p>
             <a:fld id="{FD2658F1-287C-49A0-86C8-F3A2CA321B91}" type="datetimeFigureOut">
               <a:rPr lang="fr-FR" smtClean="0"/>
-              <a:t>03/07/2017</a:t>
+              <a:t>20/10/2017</a:t>
             </a:fld>
             <a:endParaRPr lang="fr-FR"/>
           </a:p>
@@ -1887,7 +1887,7 @@
           <a:p>
             <a:fld id="{FD2658F1-287C-49A0-86C8-F3A2CA321B91}" type="datetimeFigureOut">
               <a:rPr lang="fr-FR" smtClean="0"/>
-              <a:t>03/07/2017</a:t>
+              <a:t>20/10/2017</a:t>
             </a:fld>
             <a:endParaRPr lang="fr-FR"/>
           </a:p>
@@ -1982,7 +1982,7 @@
           <a:p>
             <a:fld id="{FD2658F1-287C-49A0-86C8-F3A2CA321B91}" type="datetimeFigureOut">
               <a:rPr lang="fr-FR" smtClean="0"/>
-              <a:t>03/07/2017</a:t>
+              <a:t>20/10/2017</a:t>
             </a:fld>
             <a:endParaRPr lang="fr-FR"/>
           </a:p>
@@ -2072,8 +2072,8 @@
         </p:nvSpPr>
         <p:spPr>
           <a:xfrm>
-            <a:off x="531099" y="222170"/>
-            <a:ext cx="3494553" cy="945511"/>
+            <a:off x="543641" y="222173"/>
+            <a:ext cx="3577073" cy="945511"/>
           </a:xfrm>
         </p:spPr>
         <p:txBody>
@@ -2104,8 +2104,8 @@
         </p:nvSpPr>
         <p:spPr>
           <a:xfrm>
-            <a:off x="4152893" y="222170"/>
-            <a:ext cx="5937972" cy="4762429"/>
+            <a:off x="4250959" y="222173"/>
+            <a:ext cx="6078190" cy="4762429"/>
           </a:xfrm>
         </p:spPr>
         <p:txBody>
@@ -2189,8 +2189,8 @@
         </p:nvSpPr>
         <p:spPr>
           <a:xfrm>
-            <a:off x="531099" y="1167680"/>
-            <a:ext cx="3494553" cy="3816918"/>
+            <a:off x="543641" y="1167680"/>
+            <a:ext cx="3577073" cy="3816918"/>
           </a:xfrm>
         </p:spPr>
         <p:txBody>
@@ -2259,7 +2259,7 @@
           <a:p>
             <a:fld id="{FD2658F1-287C-49A0-86C8-F3A2CA321B91}" type="datetimeFigureOut">
               <a:rPr lang="fr-FR" smtClean="0"/>
-              <a:t>03/07/2017</a:t>
+              <a:t>20/10/2017</a:t>
             </a:fld>
             <a:endParaRPr lang="fr-FR"/>
           </a:p>
@@ -2349,8 +2349,8 @@
         </p:nvSpPr>
         <p:spPr>
           <a:xfrm>
-            <a:off x="2081980" y="3906045"/>
-            <a:ext cx="6373178" cy="461130"/>
+            <a:off x="2131145" y="3906045"/>
+            <a:ext cx="6523673" cy="461130"/>
           </a:xfrm>
         </p:spPr>
         <p:txBody>
@@ -2381,8 +2381,8 @@
         </p:nvSpPr>
         <p:spPr>
           <a:xfrm>
-            <a:off x="2081980" y="498590"/>
-            <a:ext cx="6373178" cy="3348038"/>
+            <a:off x="2131145" y="498590"/>
+            <a:ext cx="6523673" cy="3348038"/>
           </a:xfrm>
         </p:spPr>
         <p:txBody>
@@ -2442,8 +2442,8 @@
         </p:nvSpPr>
         <p:spPr>
           <a:xfrm>
-            <a:off x="2081980" y="4367175"/>
-            <a:ext cx="6373178" cy="654882"/>
+            <a:off x="2131145" y="4367175"/>
+            <a:ext cx="6523673" cy="654882"/>
           </a:xfrm>
         </p:spPr>
         <p:txBody>
@@ -2512,7 +2512,7 @@
           <a:p>
             <a:fld id="{FD2658F1-287C-49A0-86C8-F3A2CA321B91}" type="datetimeFigureOut">
               <a:rPr lang="fr-FR" smtClean="0"/>
-              <a:t>03/07/2017</a:t>
+              <a:t>20/10/2017</a:t>
             </a:fld>
             <a:endParaRPr lang="fr-FR"/>
           </a:p>
@@ -2607,8 +2607,8 @@
         </p:nvSpPr>
         <p:spPr>
           <a:xfrm>
-            <a:off x="531099" y="223463"/>
-            <a:ext cx="9559768" cy="930011"/>
+            <a:off x="543640" y="223466"/>
+            <a:ext cx="9785511" cy="930011"/>
           </a:xfrm>
           <a:prstGeom prst="rect">
             <a:avLst/>
@@ -2640,8 +2640,8 @@
         </p:nvSpPr>
         <p:spPr>
           <a:xfrm>
-            <a:off x="531099" y="1302015"/>
-            <a:ext cx="9559768" cy="3682584"/>
+            <a:off x="543640" y="1302015"/>
+            <a:ext cx="9785511" cy="3682584"/>
           </a:xfrm>
           <a:prstGeom prst="rect">
             <a:avLst/>
@@ -2702,8 +2702,8 @@
         </p:nvSpPr>
         <p:spPr>
           <a:xfrm>
-            <a:off x="531098" y="5171894"/>
-            <a:ext cx="2478459" cy="297087"/>
+            <a:off x="543639" y="5171897"/>
+            <a:ext cx="2536986" cy="297087"/>
           </a:xfrm>
           <a:prstGeom prst="rect">
             <a:avLst/>
@@ -2725,7 +2725,7 @@
           <a:p>
             <a:fld id="{FD2658F1-287C-49A0-86C8-F3A2CA321B91}" type="datetimeFigureOut">
               <a:rPr lang="fr-FR" smtClean="0"/>
-              <a:t>03/07/2017</a:t>
+              <a:t>20/10/2017</a:t>
             </a:fld>
             <a:endParaRPr lang="fr-FR"/>
           </a:p>
@@ -2743,8 +2743,8 @@
         </p:nvSpPr>
         <p:spPr>
           <a:xfrm>
-            <a:off x="3629172" y="5171894"/>
-            <a:ext cx="3363622" cy="297087"/>
+            <a:off x="3714871" y="5171897"/>
+            <a:ext cx="3443050" cy="297087"/>
           </a:xfrm>
           <a:prstGeom prst="rect">
             <a:avLst/>
@@ -2780,8 +2780,8 @@
         </p:nvSpPr>
         <p:spPr>
           <a:xfrm>
-            <a:off x="7612408" y="5171894"/>
-            <a:ext cx="2478459" cy="297087"/>
+            <a:off x="7792167" y="5171897"/>
+            <a:ext cx="2536986" cy="297087"/>
           </a:xfrm>
           <a:prstGeom prst="rect">
             <a:avLst/>
@@ -3102,7 +3102,7 @@
       </p:grpSpPr>
       <p:pic>
         <p:nvPicPr>
-          <p:cNvPr id="8" name="Picture 2"/>
+          <p:cNvPr id="17" name="Picture 2"/>
           <p:cNvPicPr>
             <a:picLocks noChangeAspect="1" noChangeArrowheads="1"/>
           </p:cNvPicPr>
@@ -3123,8 +3123,8 @@
         </p:blipFill>
         <p:spPr bwMode="auto">
           <a:xfrm>
-            <a:off x="-180528" y="-171400"/>
-            <a:ext cx="11134725" cy="5884863"/>
+            <a:off x="-161627" y="-142504"/>
+            <a:ext cx="11423650" cy="5884863"/>
           </a:xfrm>
           <a:prstGeom prst="rect">
             <a:avLst/>
@@ -3156,13 +3156,13 @@
       </p:pic>
       <p:sp>
         <p:nvSpPr>
-          <p:cNvPr id="3" name="ZoneTexte 2"/>
+          <p:cNvPr id="18" name="ZoneTexte 17"/>
           <p:cNvSpPr txBox="1"/>
           <p:nvPr/>
         </p:nvSpPr>
         <p:spPr>
           <a:xfrm>
-            <a:off x="191269" y="-230833"/>
+            <a:off x="486445" y="-119906"/>
             <a:ext cx="526106" cy="461665"/>
           </a:xfrm>
           <a:prstGeom prst="rect">
@@ -3192,13 +3192,13 @@
       </p:sp>
       <p:sp>
         <p:nvSpPr>
-          <p:cNvPr id="4" name="ZoneTexte 3"/>
+          <p:cNvPr id="19" name="ZoneTexte 18"/>
           <p:cNvSpPr txBox="1"/>
           <p:nvPr/>
         </p:nvSpPr>
         <p:spPr>
           <a:xfrm>
-            <a:off x="3715200" y="-234305"/>
+            <a:off x="3960763" y="-123378"/>
             <a:ext cx="543739" cy="461665"/>
           </a:xfrm>
           <a:prstGeom prst="rect">
@@ -3228,13 +3228,13 @@
       </p:sp>
       <p:sp>
         <p:nvSpPr>
-          <p:cNvPr id="5" name="ZoneTexte 4"/>
+          <p:cNvPr id="20" name="ZoneTexte 19"/>
           <p:cNvSpPr txBox="1"/>
           <p:nvPr/>
         </p:nvSpPr>
         <p:spPr>
           <a:xfrm>
-            <a:off x="7131600" y="-234305"/>
+            <a:off x="7377163" y="-123378"/>
             <a:ext cx="526106" cy="461665"/>
           </a:xfrm>
           <a:prstGeom prst="rect">

</xml_diff>